<commit_message>
remove spaces in commands that are causing a bug
</commit_message>
<xml_diff>
--- a/git_workshop.pptx
+++ b/git_workshop.pptx
@@ -482,7 +482,7 @@
           <a:p>
             <a:fld id="{12BA60E3-47A0-458A-8473-B13357E4806E}" type="datetimeFigureOut">
               <a:rPr lang="en-US"/>
-              <a:t>1/18/19</a:t>
+              <a:t>2/15/19</a:t>
             </a:fld>
             <a:endParaRPr lang="en-US"/>
           </a:p>
@@ -646,7 +646,7 @@
           <a:p>
             <a:fld id="{D6F4F3B1-FC5A-448B-8D77-240037331276}" type="datetimeFigureOut">
               <a:rPr lang="en-US"/>
-              <a:t>1/18/19</a:t>
+              <a:t>2/15/19</a:t>
             </a:fld>
             <a:endParaRPr lang="en-US"/>
           </a:p>
@@ -1239,7 +1239,7 @@
                 <a:tabLst/>
                 <a:defRPr/>
               </a:pPr>
-              <a:t>1/18/19</a:t>
+              <a:t>2/15/19</a:t>
             </a:fld>
             <a:endParaRPr kumimoji="0" lang="en-US" sz="1200" b="0" i="0" u="none" strike="noStrike" kern="1200" cap="none" spc="0" normalizeH="0" baseline="0" noProof="0">
               <a:ln>
@@ -1713,7 +1713,7 @@
                 <a:tabLst/>
                 <a:defRPr/>
               </a:pPr>
-              <a:t>1/18/19</a:t>
+              <a:t>2/15/19</a:t>
             </a:fld>
             <a:endParaRPr kumimoji="0" lang="en-US" sz="1200" b="0" i="0" u="none" strike="noStrike" kern="1200" cap="none" spc="0" normalizeH="0" baseline="0" noProof="0">
               <a:ln>
@@ -2073,7 +2073,7 @@
                 <a:tabLst/>
                 <a:defRPr/>
               </a:pPr>
-              <a:t>1/18/19</a:t>
+              <a:t>2/15/19</a:t>
             </a:fld>
             <a:endParaRPr kumimoji="0" lang="en-US" sz="1200" b="0" i="0" u="none" strike="noStrike" kern="1200" cap="none" spc="0" normalizeH="0" baseline="0" noProof="0">
               <a:ln>
@@ -2433,7 +2433,7 @@
                 <a:tabLst/>
                 <a:defRPr/>
               </a:pPr>
-              <a:t>1/18/19</a:t>
+              <a:t>2/15/19</a:t>
             </a:fld>
             <a:endParaRPr kumimoji="0" lang="en-US" sz="1200" b="0" i="0" u="none" strike="noStrike" kern="1200" cap="none" spc="0" normalizeH="0" baseline="0" noProof="0">
               <a:ln>
@@ -2793,7 +2793,7 @@
                 <a:tabLst/>
                 <a:defRPr/>
               </a:pPr>
-              <a:t>1/18/19</a:t>
+              <a:t>2/15/19</a:t>
             </a:fld>
             <a:endParaRPr kumimoji="0" lang="en-US" sz="1200" b="0" i="0" u="none" strike="noStrike" kern="1200" cap="none" spc="0" normalizeH="0" baseline="0" noProof="0">
               <a:ln>
@@ -3153,7 +3153,7 @@
                 <a:tabLst/>
                 <a:defRPr/>
               </a:pPr>
-              <a:t>1/18/19</a:t>
+              <a:t>2/15/19</a:t>
             </a:fld>
             <a:endParaRPr kumimoji="0" lang="en-US" sz="1200" b="0" i="0" u="none" strike="noStrike" kern="1200" cap="none" spc="0" normalizeH="0" baseline="0" noProof="0">
               <a:ln>
@@ -3513,7 +3513,7 @@
                 <a:tabLst/>
                 <a:defRPr/>
               </a:pPr>
-              <a:t>1/18/19</a:t>
+              <a:t>2/15/19</a:t>
             </a:fld>
             <a:endParaRPr kumimoji="0" lang="en-US" sz="1200" b="0" i="0" u="none" strike="noStrike" kern="1200" cap="none" spc="0" normalizeH="0" baseline="0" noProof="0">
               <a:ln>
@@ -3873,7 +3873,7 @@
                 <a:tabLst/>
                 <a:defRPr/>
               </a:pPr>
-              <a:t>1/18/19</a:t>
+              <a:t>2/15/19</a:t>
             </a:fld>
             <a:endParaRPr kumimoji="0" lang="en-US" sz="1200" b="0" i="0" u="none" strike="noStrike" kern="1200" cap="none" spc="0" normalizeH="0" baseline="0" noProof="0">
               <a:ln>
@@ -4233,7 +4233,7 @@
                 <a:tabLst/>
                 <a:defRPr/>
               </a:pPr>
-              <a:t>1/18/19</a:t>
+              <a:t>2/15/19</a:t>
             </a:fld>
             <a:endParaRPr kumimoji="0" lang="en-US" sz="1200" b="0" i="0" u="none" strike="noStrike" kern="1200" cap="none" spc="0" normalizeH="0" baseline="0" noProof="0">
               <a:ln>
@@ -4593,7 +4593,7 @@
                 <a:tabLst/>
                 <a:defRPr/>
               </a:pPr>
-              <a:t>1/18/19</a:t>
+              <a:t>2/15/19</a:t>
             </a:fld>
             <a:endParaRPr kumimoji="0" lang="en-US" sz="1200" b="0" i="0" u="none" strike="noStrike" kern="1200" cap="none" spc="0" normalizeH="0" baseline="0" noProof="0">
               <a:ln>
@@ -4953,7 +4953,7 @@
                 <a:tabLst/>
                 <a:defRPr/>
               </a:pPr>
-              <a:t>1/18/19</a:t>
+              <a:t>2/15/19</a:t>
             </a:fld>
             <a:endParaRPr kumimoji="0" lang="en-US" sz="1200" b="0" i="0" u="none" strike="noStrike" kern="1200" cap="none" spc="0" normalizeH="0" baseline="0" noProof="0">
               <a:ln>
@@ -5313,7 +5313,7 @@
                 <a:tabLst/>
                 <a:defRPr/>
               </a:pPr>
-              <a:t>1/18/19</a:t>
+              <a:t>2/15/19</a:t>
             </a:fld>
             <a:endParaRPr kumimoji="0" lang="en-US" sz="1200" b="0" i="0" u="none" strike="noStrike" kern="1200" cap="none" spc="0" normalizeH="0" baseline="0" noProof="0">
               <a:ln>
@@ -5673,7 +5673,7 @@
                 <a:tabLst/>
                 <a:defRPr/>
               </a:pPr>
-              <a:t>1/18/19</a:t>
+              <a:t>2/15/19</a:t>
             </a:fld>
             <a:endParaRPr kumimoji="0" lang="en-US" sz="1200" b="0" i="0" u="none" strike="noStrike" kern="1200" cap="none" spc="0" normalizeH="0" baseline="0" noProof="0">
               <a:ln>
@@ -6033,7 +6033,7 @@
                 <a:tabLst/>
                 <a:defRPr/>
               </a:pPr>
-              <a:t>1/18/19</a:t>
+              <a:t>2/15/19</a:t>
             </a:fld>
             <a:endParaRPr kumimoji="0" lang="en-US" sz="1200" b="0" i="0" u="none" strike="noStrike" kern="1200" cap="none" spc="0" normalizeH="0" baseline="0" noProof="0">
               <a:ln>
@@ -6393,7 +6393,7 @@
                 <a:tabLst/>
                 <a:defRPr/>
               </a:pPr>
-              <a:t>1/18/19</a:t>
+              <a:t>2/15/19</a:t>
             </a:fld>
             <a:endParaRPr kumimoji="0" lang="en-US" sz="1200" b="0" i="0" u="none" strike="noStrike" kern="1200" cap="none" spc="0" normalizeH="0" baseline="0" noProof="0">
               <a:ln>
@@ -6753,7 +6753,7 @@
                 <a:tabLst/>
                 <a:defRPr/>
               </a:pPr>
-              <a:t>1/18/19</a:t>
+              <a:t>2/15/19</a:t>
             </a:fld>
             <a:endParaRPr kumimoji="0" lang="en-US" sz="1200" b="0" i="0" u="none" strike="noStrike" kern="1200" cap="none" spc="0" normalizeH="0" baseline="0" noProof="0">
               <a:ln>
@@ -7113,7 +7113,7 @@
                 <a:tabLst/>
                 <a:defRPr/>
               </a:pPr>
-              <a:t>1/18/19</a:t>
+              <a:t>2/15/19</a:t>
             </a:fld>
             <a:endParaRPr kumimoji="0" lang="en-US" sz="1200" b="0" i="0" u="none" strike="noStrike" kern="1200" cap="none" spc="0" normalizeH="0" baseline="0" noProof="0">
               <a:ln>
@@ -7473,7 +7473,7 @@
                 <a:tabLst/>
                 <a:defRPr/>
               </a:pPr>
-              <a:t>1/18/19</a:t>
+              <a:t>2/15/19</a:t>
             </a:fld>
             <a:endParaRPr kumimoji="0" lang="en-US" sz="1200" b="0" i="0" u="none" strike="noStrike" kern="1200" cap="none" spc="0" normalizeH="0" baseline="0" noProof="0">
               <a:ln>
@@ -7833,7 +7833,7 @@
                 <a:tabLst/>
                 <a:defRPr/>
               </a:pPr>
-              <a:t>1/18/19</a:t>
+              <a:t>2/15/19</a:t>
             </a:fld>
             <a:endParaRPr kumimoji="0" lang="en-US" sz="1200" b="0" i="0" u="none" strike="noStrike" kern="1200" cap="none" spc="0" normalizeH="0" baseline="0" noProof="0">
               <a:ln>
@@ -8193,7 +8193,7 @@
                 <a:tabLst/>
                 <a:defRPr/>
               </a:pPr>
-              <a:t>1/18/19</a:t>
+              <a:t>2/15/19</a:t>
             </a:fld>
             <a:endParaRPr kumimoji="0" lang="en-US" sz="1200" b="0" i="0" u="none" strike="noStrike" kern="1200" cap="none" spc="0" normalizeH="0" baseline="0" noProof="0">
               <a:ln>
@@ -8553,7 +8553,7 @@
                 <a:tabLst/>
                 <a:defRPr/>
               </a:pPr>
-              <a:t>1/18/19</a:t>
+              <a:t>2/15/19</a:t>
             </a:fld>
             <a:endParaRPr kumimoji="0" lang="en-US" sz="1200" b="0" i="0" u="none" strike="noStrike" kern="1200" cap="none" spc="0" normalizeH="0" baseline="0" noProof="0">
               <a:ln>
@@ -8913,7 +8913,7 @@
                 <a:tabLst/>
                 <a:defRPr/>
               </a:pPr>
-              <a:t>1/18/19</a:t>
+              <a:t>2/15/19</a:t>
             </a:fld>
             <a:endParaRPr kumimoji="0" lang="en-US" sz="1200" b="0" i="0" u="none" strike="noStrike" kern="1200" cap="none" spc="0" normalizeH="0" baseline="0" noProof="0">
               <a:ln>
@@ -9273,7 +9273,7 @@
                 <a:tabLst/>
                 <a:defRPr/>
               </a:pPr>
-              <a:t>1/18/19</a:t>
+              <a:t>2/15/19</a:t>
             </a:fld>
             <a:endParaRPr kumimoji="0" lang="en-US" sz="1200" b="0" i="0" u="none" strike="noStrike" kern="1200" cap="none" spc="0" normalizeH="0" baseline="0" noProof="0">
               <a:ln>
@@ -9633,7 +9633,7 @@
                 <a:tabLst/>
                 <a:defRPr/>
               </a:pPr>
-              <a:t>1/18/19</a:t>
+              <a:t>2/15/19</a:t>
             </a:fld>
             <a:endParaRPr kumimoji="0" lang="en-US" sz="1200" b="0" i="0" u="none" strike="noStrike" kern="1200" cap="none" spc="0" normalizeH="0" baseline="0" noProof="0">
               <a:ln>
@@ -9993,7 +9993,7 @@
                 <a:tabLst/>
                 <a:defRPr/>
               </a:pPr>
-              <a:t>1/18/19</a:t>
+              <a:t>2/15/19</a:t>
             </a:fld>
             <a:endParaRPr kumimoji="0" lang="en-US" sz="1200" b="0" i="0" u="none" strike="noStrike" kern="1200" cap="none" spc="0" normalizeH="0" baseline="0" noProof="0">
               <a:ln>
@@ -10467,7 +10467,7 @@
                 <a:tabLst/>
                 <a:defRPr/>
               </a:pPr>
-              <a:t>1/18/19</a:t>
+              <a:t>2/15/19</a:t>
             </a:fld>
             <a:endParaRPr kumimoji="0" lang="en-US" sz="1200" b="0" i="0" u="none" strike="noStrike" kern="1200" cap="none" spc="0" normalizeH="0" baseline="0" noProof="0">
               <a:ln>
@@ -10827,7 +10827,7 @@
                 <a:tabLst/>
                 <a:defRPr/>
               </a:pPr>
-              <a:t>1/18/19</a:t>
+              <a:t>2/15/19</a:t>
             </a:fld>
             <a:endParaRPr kumimoji="0" lang="en-US" sz="1200" b="0" i="0" u="none" strike="noStrike" kern="1200" cap="none" spc="0" normalizeH="0" baseline="0" noProof="0">
               <a:ln>
@@ -31151,7 +31151,7 @@
         <p:spPr>
           <a:xfrm>
             <a:off x="1080000" y="2308680"/>
-            <a:ext cx="5760000" cy="715320"/>
+            <a:ext cx="5434991" cy="415198"/>
           </a:xfrm>
           <a:prstGeom prst="rect">
             <a:avLst/>
@@ -31181,7 +31181,7 @@
               <a:tabLst/>
             </a:pPr>
             <a:r>
-              <a:rPr lang="en-GB" sz="2200" b="0" i="0" u="none" strike="noStrike" kern="1200" cap="none">
+              <a:rPr lang="en-GB" sz="2200" b="0" i="0" u="none" strike="noStrike" kern="1200" cap="none" dirty="0">
                 <a:ln>
                   <a:noFill/>
                 </a:ln>
@@ -31189,7 +31189,29 @@
                 <a:ea typeface="Noto Sans CJK SC Regular" pitchFamily="2"/>
                 <a:cs typeface="FreeSans" pitchFamily="2"/>
               </a:rPr>
-              <a:t>$ git config -- global user.name “John Doe”</a:t>
+              <a:t>$ git config --global </a:t>
+            </a:r>
+            <a:r>
+              <a:rPr lang="en-GB" sz="2200" b="0" i="0" u="none" strike="noStrike" kern="1200" cap="none" dirty="0" err="1">
+                <a:ln>
+                  <a:noFill/>
+                </a:ln>
+                <a:latin typeface="Liberation Sans" pitchFamily="18"/>
+                <a:ea typeface="Noto Sans CJK SC Regular" pitchFamily="2"/>
+                <a:cs typeface="FreeSans" pitchFamily="2"/>
+              </a:rPr>
+              <a:t>user.name</a:t>
+            </a:r>
+            <a:r>
+              <a:rPr lang="en-GB" sz="2200" b="0" i="0" u="none" strike="noStrike" kern="1200" cap="none" dirty="0">
+                <a:ln>
+                  <a:noFill/>
+                </a:ln>
+                <a:latin typeface="Liberation Sans" pitchFamily="18"/>
+                <a:ea typeface="Noto Sans CJK SC Regular" pitchFamily="2"/>
+                <a:cs typeface="FreeSans" pitchFamily="2"/>
+              </a:rPr>
+              <a:t> “John Doe”</a:t>
             </a:r>
           </a:p>
         </p:txBody>
@@ -31400,7 +31422,7 @@
         <p:spPr>
           <a:xfrm>
             <a:off x="1007999" y="3388680"/>
-            <a:ext cx="7272000" cy="715320"/>
+            <a:ext cx="7164054" cy="415198"/>
           </a:xfrm>
           <a:prstGeom prst="rect">
             <a:avLst/>
@@ -31430,7 +31452,7 @@
               <a:tabLst/>
             </a:pPr>
             <a:r>
-              <a:rPr lang="en-GB" sz="2200" b="0" i="0" u="none" strike="noStrike" kern="1200" cap="none">
+              <a:rPr lang="en-GB" sz="2200" b="0" i="0" u="none" strike="noStrike" kern="1200" cap="none" dirty="0">
                 <a:ln>
                   <a:noFill/>
                 </a:ln>
@@ -31438,7 +31460,51 @@
                 <a:ea typeface="Noto Sans CJK SC Regular" pitchFamily="2"/>
                 <a:cs typeface="FreeSans" pitchFamily="2"/>
               </a:rPr>
-              <a:t>$ git config -- global user.email “johndoe@example.com”</a:t>
+              <a:t>$ git config --global </a:t>
+            </a:r>
+            <a:r>
+              <a:rPr lang="en-GB" sz="2200" b="0" i="0" u="none" strike="noStrike" kern="1200" cap="none" dirty="0" err="1">
+                <a:ln>
+                  <a:noFill/>
+                </a:ln>
+                <a:latin typeface="Liberation Sans" pitchFamily="18"/>
+                <a:ea typeface="Noto Sans CJK SC Regular" pitchFamily="2"/>
+                <a:cs typeface="FreeSans" pitchFamily="2"/>
+              </a:rPr>
+              <a:t>user.email</a:t>
+            </a:r>
+            <a:r>
+              <a:rPr lang="en-GB" sz="2200" b="0" i="0" u="none" strike="noStrike" kern="1200" cap="none" dirty="0">
+                <a:ln>
+                  <a:noFill/>
+                </a:ln>
+                <a:latin typeface="Liberation Sans" pitchFamily="18"/>
+                <a:ea typeface="Noto Sans CJK SC Regular" pitchFamily="2"/>
+                <a:cs typeface="FreeSans" pitchFamily="2"/>
+              </a:rPr>
+              <a:t> “</a:t>
+            </a:r>
+            <a:r>
+              <a:rPr lang="en-GB" sz="2200" b="0" i="0" u="none" strike="noStrike" kern="1200" cap="none" dirty="0" err="1">
+                <a:ln>
+                  <a:noFill/>
+                </a:ln>
+                <a:latin typeface="Liberation Sans" pitchFamily="18"/>
+                <a:ea typeface="Noto Sans CJK SC Regular" pitchFamily="2"/>
+                <a:cs typeface="FreeSans" pitchFamily="2"/>
+              </a:rPr>
+              <a:t>johndoe@example.com</a:t>
+            </a:r>
+            <a:r>
+              <a:rPr lang="en-GB" sz="2200" b="0" i="0" u="none" strike="noStrike" kern="1200" cap="none" dirty="0">
+                <a:ln>
+                  <a:noFill/>
+                </a:ln>
+                <a:latin typeface="Liberation Sans" pitchFamily="18"/>
+                <a:ea typeface="Noto Sans CJK SC Regular" pitchFamily="2"/>
+                <a:cs typeface="FreeSans" pitchFamily="2"/>
+              </a:rPr>
+              <a:t>”</a:t>
             </a:r>
           </a:p>
         </p:txBody>
@@ -31687,7 +31753,7 @@
                 <a:ea typeface="Noto Sans CJK SC Regular" pitchFamily="2"/>
                 <a:cs typeface="FreeSans" pitchFamily="2"/>
               </a:rPr>
-              <a:t>$ git config -- global </a:t>
+              <a:t>$ git config --global </a:t>
             </a:r>
             <a:r>
               <a:rPr lang="en-GB" sz="2200" b="0" i="0" u="none" strike="noStrike" kern="1200" cap="none" dirty="0" err="1">
@@ -31982,8 +32048,27 @@
                 <a:ea typeface="Noto Sans CJK SC Regular" pitchFamily="2"/>
                 <a:cs typeface="FreeSans" pitchFamily="2"/>
               </a:rPr>
-              <a:t>$ git config -- list</a:t>
-            </a:r>
+              <a:t>$ git </a:t>
+            </a:r>
+            <a:r>
+              <a:rPr lang="en-GB" sz="2200" b="0" i="0" u="none" strike="noStrike" kern="1200" cap="none">
+                <a:ln>
+                  <a:noFill/>
+                </a:ln>
+                <a:latin typeface="Liberation Sans" pitchFamily="18"/>
+                <a:ea typeface="Noto Sans CJK SC Regular" pitchFamily="2"/>
+                <a:cs typeface="FreeSans" pitchFamily="2"/>
+              </a:rPr>
+              <a:t>config --list</a:t>
+            </a:r>
+            <a:endParaRPr lang="en-GB" sz="2200" b="0" i="0" u="none" strike="noStrike" kern="1200" cap="none" dirty="0">
+              <a:ln>
+                <a:noFill/>
+              </a:ln>
+              <a:latin typeface="Liberation Sans" pitchFamily="18"/>
+              <a:ea typeface="Noto Sans CJK SC Regular" pitchFamily="2"/>
+              <a:cs typeface="FreeSans" pitchFamily="2"/>
+            </a:endParaRPr>
           </a:p>
           <a:p>
             <a:pPr marL="0" marR="0" lvl="0" indent="0" rtl="0" hangingPunct="0">

</xml_diff>

<commit_message>
fix a couple of typos
</commit_message>
<xml_diff>
--- a/git_workshop.pptx
+++ b/git_workshop.pptx
@@ -469,7 +469,7 @@
           <a:p>
             <a:fld id="{12BA60E3-47A0-458A-8473-B13357E4806E}" type="datetimeFigureOut">
               <a:rPr lang="en-US"/>
-              <a:t>5/14/22</a:t>
+              <a:t>5/17/22</a:t>
             </a:fld>
             <a:endParaRPr lang="en-US"/>
           </a:p>
@@ -633,7 +633,7 @@
           <a:p>
             <a:fld id="{D6F4F3B1-FC5A-448B-8D77-240037331276}" type="datetimeFigureOut">
               <a:rPr lang="en-US"/>
-              <a:t>5/14/22</a:t>
+              <a:t>5/17/22</a:t>
             </a:fld>
             <a:endParaRPr lang="en-US"/>
           </a:p>
@@ -1226,7 +1226,7 @@
                 <a:tabLst/>
                 <a:defRPr/>
               </a:pPr>
-              <a:t>5/14/22</a:t>
+              <a:t>5/17/22</a:t>
             </a:fld>
             <a:endParaRPr kumimoji="0" lang="en-US" sz="1200" b="0" i="0" u="none" strike="noStrike" kern="1200" cap="none" spc="0" normalizeH="0" baseline="0" noProof="0">
               <a:ln>
@@ -1589,7 +1589,7 @@
                 <a:tabLst/>
                 <a:defRPr/>
               </a:pPr>
-              <a:t>5/14/22</a:t>
+              <a:t>5/17/22</a:t>
             </a:fld>
             <a:endParaRPr kumimoji="0" lang="en-US" sz="1200" b="0" i="0" u="none" strike="noStrike" kern="1200" cap="none" spc="0" normalizeH="0" baseline="0" noProof="0">
               <a:ln>
@@ -1949,7 +1949,7 @@
                 <a:tabLst/>
                 <a:defRPr/>
               </a:pPr>
-              <a:t>5/14/22</a:t>
+              <a:t>5/17/22</a:t>
             </a:fld>
             <a:endParaRPr kumimoji="0" lang="en-US" sz="1200" b="0" i="0" u="none" strike="noStrike" kern="1200" cap="none" spc="0" normalizeH="0" baseline="0" noProof="0">
               <a:ln>
@@ -2309,7 +2309,7 @@
                 <a:tabLst/>
                 <a:defRPr/>
               </a:pPr>
-              <a:t>5/14/22</a:t>
+              <a:t>5/17/22</a:t>
             </a:fld>
             <a:endParaRPr kumimoji="0" lang="en-US" sz="1200" b="0" i="0" u="none" strike="noStrike" kern="1200" cap="none" spc="0" normalizeH="0" baseline="0" noProof="0">
               <a:ln>
@@ -2669,7 +2669,7 @@
                 <a:tabLst/>
                 <a:defRPr/>
               </a:pPr>
-              <a:t>5/14/22</a:t>
+              <a:t>5/17/22</a:t>
             </a:fld>
             <a:endParaRPr kumimoji="0" lang="en-US" sz="1200" b="0" i="0" u="none" strike="noStrike" kern="1200" cap="none" spc="0" normalizeH="0" baseline="0" noProof="0">
               <a:ln>
@@ -3029,7 +3029,7 @@
                 <a:tabLst/>
                 <a:defRPr/>
               </a:pPr>
-              <a:t>5/14/22</a:t>
+              <a:t>5/17/22</a:t>
             </a:fld>
             <a:endParaRPr kumimoji="0" lang="en-US" sz="1200" b="0" i="0" u="none" strike="noStrike" kern="1200" cap="none" spc="0" normalizeH="0" baseline="0" noProof="0">
               <a:ln>
@@ -3392,7 +3392,7 @@
                 <a:tabLst/>
                 <a:defRPr/>
               </a:pPr>
-              <a:t>5/14/22</a:t>
+              <a:t>5/17/22</a:t>
             </a:fld>
             <a:endParaRPr kumimoji="0" lang="en-US" sz="1200" b="0" i="0" u="none" strike="noStrike" kern="1200" cap="none" spc="0" normalizeH="0" baseline="0" noProof="0">
               <a:ln>
@@ -14940,7 +14940,7 @@
           <a:p>
             <a:r>
               <a:rPr lang="en-US" dirty="0"/>
-              <a:t>Select ”Use this template” button to create your own folk</a:t>
+              <a:t>Select “Use this template” button to create your own fork</a:t>
             </a:r>
           </a:p>
           <a:p>
@@ -16923,7 +16923,7 @@
             <a:pPr marL="1257300" lvl="1" indent="-571500"/>
             <a:r>
               <a:rPr lang="en-US" dirty="0"/>
-              <a:t>Will be used as the first part of you website address</a:t>
+              <a:t>Will be used as the first part of your website address</a:t>
             </a:r>
           </a:p>
           <a:p>
@@ -17024,13 +17024,7 @@
               <a:rPr lang="en-US" dirty="0">
                 <a:hlinkClick r:id="rId2"/>
               </a:rPr>
-              <a:t>Written </a:t>
-            </a:r>
-            <a:r>
-              <a:rPr lang="en-US" dirty="0" err="1">
-                <a:hlinkClick r:id="rId2"/>
-              </a:rPr>
-              <a:t>Guidence</a:t>
+              <a:t>Written Guidance</a:t>
             </a:r>
             <a:endParaRPr lang="en-US" dirty="0"/>
           </a:p>

</xml_diff>